<commit_message>
Reset tuning method to initial 10TSCV
</commit_message>
<xml_diff>
--- a/Notes/Dokumentation zum Vorgehen.pptx
+++ b/Notes/Dokumentation zum Vorgehen.pptx
@@ -14,13 +14,15 @@
     <p:sldId id="262" r:id="rId8"/>
     <p:sldId id="266" r:id="rId9"/>
     <p:sldId id="269" r:id="rId10"/>
-    <p:sldId id="277" r:id="rId11"/>
-    <p:sldId id="276" r:id="rId12"/>
-    <p:sldId id="273" r:id="rId13"/>
-    <p:sldId id="275" r:id="rId14"/>
-    <p:sldId id="272" r:id="rId15"/>
-    <p:sldId id="274" r:id="rId16"/>
-    <p:sldId id="268" r:id="rId17"/>
+    <p:sldId id="278" r:id="rId11"/>
+    <p:sldId id="279" r:id="rId12"/>
+    <p:sldId id="277" r:id="rId13"/>
+    <p:sldId id="276" r:id="rId14"/>
+    <p:sldId id="273" r:id="rId15"/>
+    <p:sldId id="275" r:id="rId16"/>
+    <p:sldId id="272" r:id="rId17"/>
+    <p:sldId id="274" r:id="rId18"/>
+    <p:sldId id="268" r:id="rId19"/>
   </p:sldIdLst>
   <p:sldSz cx="12192000" cy="6858000"/>
   <p:notesSz cx="6858000" cy="9144000"/>
@@ -141,6 +143,8 @@
         <p14:section name="Tuning Impact" id="{77B93B8F-05CD-4D9C-83ED-5CAC814D618E}">
           <p14:sldIdLst>
             <p14:sldId id="269"/>
+            <p14:sldId id="278"/>
+            <p14:sldId id="279"/>
           </p14:sldIdLst>
         </p14:section>
         <p14:section name="Best Params" id="{9E855B2D-E6B9-479C-9AC8-6A581640F9A2}">
@@ -3606,7 +3610,7 @@
           <p:cNvPr id="2" name="Title 1">
             <a:extLst>
               <a:ext uri="{FF2B5EF4-FFF2-40B4-BE49-F238E27FC236}">
-                <a16:creationId xmlns:a16="http://schemas.microsoft.com/office/drawing/2014/main" id="{596AE776-D028-463F-ADE3-216DAE4A623C}"/>
+                <a16:creationId xmlns:a16="http://schemas.microsoft.com/office/drawing/2014/main" id="{5195C7F1-F49B-477C-8344-6940155484CE}"/>
               </a:ext>
             </a:extLst>
           </p:cNvPr>
@@ -3619,14 +3623,32 @@
         </p:nvSpPr>
         <p:spPr/>
         <p:txBody>
-          <a:bodyPr/>
-          <a:lstStyle/>
-          <a:p>
-            <a:r>
-              <a:rPr lang="de-DE" dirty="0"/>
-              <a:t>Evtl. Histogramm, wie oft welcher Param-Wert? </a:t>
-            </a:r>
-            <a:endParaRPr lang="en-US" dirty="0"/>
+          <a:bodyPr>
+            <a:normAutofit/>
+          </a:bodyPr>
+          <a:lstStyle/>
+          <a:p>
+            <a:r>
+              <a:rPr lang="de-DE" sz="3600" dirty="0"/>
+              <a:t>Tuning pro </a:t>
+            </a:r>
+            <a:r>
+              <a:rPr lang="de-DE" sz="3600" dirty="0" err="1"/>
+              <a:t>Grp</a:t>
+            </a:r>
+            <a:r>
+              <a:rPr lang="de-DE" sz="3600" dirty="0"/>
+              <a:t>: 10TSCV zu geringe Tuning-Mengen, </a:t>
+            </a:r>
+            <a:r>
+              <a:rPr lang="de-DE" sz="3600" dirty="0" err="1"/>
+              <a:t>instablie</a:t>
+            </a:r>
+            <a:r>
+              <a:rPr lang="de-DE" sz="3600" dirty="0"/>
+              <a:t> Ergebnisse</a:t>
+            </a:r>
+            <a:endParaRPr lang="en-US" sz="3600" dirty="0"/>
           </a:p>
         </p:txBody>
       </p:sp>
@@ -3635,7 +3657,7 @@
           <p:cNvPr id="3" name="Content Placeholder 2">
             <a:extLst>
               <a:ext uri="{FF2B5EF4-FFF2-40B4-BE49-F238E27FC236}">
-                <a16:creationId xmlns:a16="http://schemas.microsoft.com/office/drawing/2014/main" id="{D32DB8D2-3CAD-4097-91D9-37627443D356}"/>
+                <a16:creationId xmlns:a16="http://schemas.microsoft.com/office/drawing/2014/main" id="{1AE54C3C-C97E-48C0-BA17-43A8455FD4D4}"/>
               </a:ext>
             </a:extLst>
           </p:cNvPr>
@@ -3648,21 +3670,461 @@
         </p:nvSpPr>
         <p:spPr/>
         <p:txBody>
-          <a:bodyPr/>
-          <a:lstStyle/>
-          <a:p>
-            <a:r>
-              <a:rPr lang="de-DE" dirty="0"/>
-              <a:t>TBD</a:t>
-            </a:r>
-            <a:endParaRPr lang="en-US" dirty="0"/>
+          <a:bodyPr>
+            <a:normAutofit/>
+          </a:bodyPr>
+          <a:lstStyle/>
+          <a:p>
+            <a:r>
+              <a:rPr lang="de-DE" sz="2400" dirty="0">
+                <a:solidFill>
+                  <a:srgbClr val="FF0000"/>
+                </a:solidFill>
+              </a:rPr>
+              <a:t>Nochmal versuchen mit festen Tuning </a:t>
+            </a:r>
+            <a:r>
+              <a:rPr lang="de-DE" sz="2400" dirty="0" err="1">
+                <a:solidFill>
+                  <a:srgbClr val="FF0000"/>
+                </a:solidFill>
+              </a:rPr>
+              <a:t>set</a:t>
+            </a:r>
+            <a:r>
+              <a:rPr lang="de-DE" sz="2400" dirty="0">
+                <a:solidFill>
+                  <a:srgbClr val="FF0000"/>
+                </a:solidFill>
+              </a:rPr>
+              <a:t> oder weniger TSCV?</a:t>
+            </a:r>
+          </a:p>
+          <a:p>
+            <a:r>
+              <a:rPr lang="de-DE" sz="2400" dirty="0">
+                <a:solidFill>
+                  <a:srgbClr val="FF0000"/>
+                </a:solidFill>
+              </a:rPr>
+              <a:t>DT:</a:t>
+            </a:r>
+          </a:p>
+          <a:p>
+            <a:endParaRPr lang="de-DE" sz="2400" dirty="0">
+              <a:solidFill>
+                <a:srgbClr val="FF0000"/>
+              </a:solidFill>
+            </a:endParaRPr>
+          </a:p>
+          <a:p>
+            <a:endParaRPr lang="de-DE" sz="2400" dirty="0">
+              <a:solidFill>
+                <a:srgbClr val="FF0000"/>
+              </a:solidFill>
+            </a:endParaRPr>
+          </a:p>
+          <a:p>
+            <a:endParaRPr lang="de-DE" sz="2400" dirty="0">
+              <a:solidFill>
+                <a:srgbClr val="FF0000"/>
+              </a:solidFill>
+            </a:endParaRPr>
+          </a:p>
+          <a:p>
+            <a:endParaRPr lang="de-DE" sz="2400" dirty="0">
+              <a:solidFill>
+                <a:srgbClr val="FF0000"/>
+              </a:solidFill>
+            </a:endParaRPr>
+          </a:p>
+          <a:p>
+            <a:endParaRPr lang="de-DE" sz="2400" dirty="0">
+              <a:solidFill>
+                <a:srgbClr val="FF0000"/>
+              </a:solidFill>
+            </a:endParaRPr>
+          </a:p>
+          <a:p>
+            <a:r>
+              <a:rPr lang="en-US" sz="2400" dirty="0">
+                <a:solidFill>
+                  <a:srgbClr val="FF0000"/>
+                </a:solidFill>
+              </a:rPr>
+              <a:t>RF:</a:t>
+            </a:r>
+            <a:endParaRPr lang="de-DE" sz="2400" dirty="0">
+              <a:solidFill>
+                <a:srgbClr val="FF0000"/>
+              </a:solidFill>
+            </a:endParaRPr>
+          </a:p>
+        </p:txBody>
+      </p:sp>
+      <p:sp>
+        <p:nvSpPr>
+          <p:cNvPr id="4" name="Rectangle 3">
+            <a:extLst>
+              <a:ext uri="{FF2B5EF4-FFF2-40B4-BE49-F238E27FC236}">
+                <a16:creationId xmlns:a16="http://schemas.microsoft.com/office/drawing/2014/main" id="{EFB09F89-F0E1-4D20-82E4-97936EE761FF}"/>
+              </a:ext>
+            </a:extLst>
+          </p:cNvPr>
+          <p:cNvSpPr/>
+          <p:nvPr/>
+        </p:nvSpPr>
+        <p:spPr>
+          <a:xfrm>
+            <a:off x="975918" y="2531107"/>
+            <a:ext cx="2606180" cy="769441"/>
+          </a:xfrm>
+          <a:prstGeom prst="rect">
+            <a:avLst/>
+          </a:prstGeom>
+        </p:spPr>
+        <p:txBody>
+          <a:bodyPr wrap="square">
+            <a:spAutoFit/>
+          </a:bodyPr>
+          <a:lstStyle/>
+          <a:p>
+            <a:r>
+              <a:rPr lang="en-US" sz="1100" dirty="0">
+                <a:hlinkClick r:id="rId2"/>
+              </a:rPr>
+              <a:t>https://notebooks.azure.com/felix-schuhbauer/projects/bsc-thesis-ml/html/Plots/Evaluation-Plots/Group1-Tuning-Impact-TunedDT.jpeg</a:t>
+            </a:r>
+            <a:endParaRPr lang="en-US" sz="1100" dirty="0"/>
+          </a:p>
+        </p:txBody>
+      </p:sp>
+      <p:sp>
+        <p:nvSpPr>
+          <p:cNvPr id="5" name="Rectangle 4">
+            <a:extLst>
+              <a:ext uri="{FF2B5EF4-FFF2-40B4-BE49-F238E27FC236}">
+                <a16:creationId xmlns:a16="http://schemas.microsoft.com/office/drawing/2014/main" id="{9C1CD01F-9F68-4BB5-8953-E81D01668D28}"/>
+              </a:ext>
+            </a:extLst>
+          </p:cNvPr>
+          <p:cNvSpPr/>
+          <p:nvPr/>
+        </p:nvSpPr>
+        <p:spPr>
+          <a:xfrm>
+            <a:off x="4650296" y="2531106"/>
+            <a:ext cx="2606180" cy="769441"/>
+          </a:xfrm>
+          <a:prstGeom prst="rect">
+            <a:avLst/>
+          </a:prstGeom>
+        </p:spPr>
+        <p:txBody>
+          <a:bodyPr wrap="square">
+            <a:spAutoFit/>
+          </a:bodyPr>
+          <a:lstStyle/>
+          <a:p>
+            <a:r>
+              <a:rPr lang="en-US" sz="1100" dirty="0">
+                <a:hlinkClick r:id="rId2"/>
+              </a:rPr>
+              <a:t>https://notebooks.azure.com/felix-schuhbauer/projects/bsc-thesis-ml/html/Plots/Evaluation-Plots/Group2-Tuning-Impact-TunedDT.jpeg</a:t>
+            </a:r>
+            <a:endParaRPr lang="en-US" sz="1100" dirty="0"/>
+          </a:p>
+        </p:txBody>
+      </p:sp>
+      <p:sp>
+        <p:nvSpPr>
+          <p:cNvPr id="8" name="Rectangle 7">
+            <a:extLst>
+              <a:ext uri="{FF2B5EF4-FFF2-40B4-BE49-F238E27FC236}">
+                <a16:creationId xmlns:a16="http://schemas.microsoft.com/office/drawing/2014/main" id="{A30B6C80-D5E6-452A-87AC-32FCDA7E3B37}"/>
+              </a:ext>
+            </a:extLst>
+          </p:cNvPr>
+          <p:cNvSpPr/>
+          <p:nvPr/>
+        </p:nvSpPr>
+        <p:spPr>
+          <a:xfrm>
+            <a:off x="8324674" y="2531105"/>
+            <a:ext cx="2606180" cy="769441"/>
+          </a:xfrm>
+          <a:prstGeom prst="rect">
+            <a:avLst/>
+          </a:prstGeom>
+        </p:spPr>
+        <p:txBody>
+          <a:bodyPr wrap="square">
+            <a:spAutoFit/>
+          </a:bodyPr>
+          <a:lstStyle/>
+          <a:p>
+            <a:r>
+              <a:rPr lang="en-US" sz="1100" dirty="0">
+                <a:hlinkClick r:id="rId2"/>
+              </a:rPr>
+              <a:t>https://notebooks.azure.com/felix-schuhbauer/projects/bsc-thesis-ml/html/Plots/Evaluation-Plots/Group3-Tuning-Impact-TunedDT.jpeg</a:t>
+            </a:r>
+            <a:endParaRPr lang="en-US" sz="1100" dirty="0"/>
+          </a:p>
+        </p:txBody>
+      </p:sp>
+      <p:pic>
+        <p:nvPicPr>
+          <p:cNvPr id="1026" name="Picture 2">
+            <a:extLst>
+              <a:ext uri="{FF2B5EF4-FFF2-40B4-BE49-F238E27FC236}">
+                <a16:creationId xmlns:a16="http://schemas.microsoft.com/office/drawing/2014/main" id="{607D7D9B-1540-43B4-A977-01A2013205FD}"/>
+              </a:ext>
+            </a:extLst>
+          </p:cNvPr>
+          <p:cNvPicPr>
+            <a:picLocks noChangeAspect="1" noChangeArrowheads="1"/>
+          </p:cNvPicPr>
+          <p:nvPr/>
+        </p:nvPicPr>
+        <p:blipFill>
+          <a:blip r:embed="rId3">
+            <a:extLst>
+              <a:ext uri="{28A0092B-C50C-407E-A947-70E740481C1C}">
+                <a14:useLocalDpi xmlns:a14="http://schemas.microsoft.com/office/drawing/2010/main" val="0"/>
+              </a:ext>
+            </a:extLst>
+          </a:blip>
+          <a:srcRect/>
+          <a:stretch>
+            <a:fillRect/>
+          </a:stretch>
+        </p:blipFill>
+        <p:spPr bwMode="auto">
+          <a:xfrm>
+            <a:off x="736440" y="3256221"/>
+            <a:ext cx="2960092" cy="1691481"/>
+          </a:xfrm>
+          <a:prstGeom prst="rect">
+            <a:avLst/>
+          </a:prstGeom>
+          <a:noFill/>
+          <a:extLst>
+            <a:ext uri="{909E8E84-426E-40DD-AFC4-6F175D3DCCD1}">
+              <a14:hiddenFill xmlns:a14="http://schemas.microsoft.com/office/drawing/2010/main">
+                <a:solidFill>
+                  <a:srgbClr val="FFFFFF"/>
+                </a:solidFill>
+              </a14:hiddenFill>
+            </a:ext>
+          </a:extLst>
+        </p:spPr>
+      </p:pic>
+      <p:pic>
+        <p:nvPicPr>
+          <p:cNvPr id="1028" name="Picture 4">
+            <a:extLst>
+              <a:ext uri="{FF2B5EF4-FFF2-40B4-BE49-F238E27FC236}">
+                <a16:creationId xmlns:a16="http://schemas.microsoft.com/office/drawing/2014/main" id="{6BB7C493-C587-4AA8-8DB0-19D3C6549BD0}"/>
+              </a:ext>
+            </a:extLst>
+          </p:cNvPr>
+          <p:cNvPicPr>
+            <a:picLocks noChangeAspect="1" noChangeArrowheads="1"/>
+          </p:cNvPicPr>
+          <p:nvPr/>
+        </p:nvPicPr>
+        <p:blipFill rotWithShape="1">
+          <a:blip r:embed="rId4">
+            <a:extLst>
+              <a:ext uri="{28A0092B-C50C-407E-A947-70E740481C1C}">
+                <a14:useLocalDpi xmlns:a14="http://schemas.microsoft.com/office/drawing/2010/main" val="0"/>
+              </a:ext>
+            </a:extLst>
+          </a:blip>
+          <a:srcRect l="5979" t="7107" r="8387" b="6342"/>
+          <a:stretch/>
+        </p:blipFill>
+        <p:spPr bwMode="auto">
+          <a:xfrm>
+            <a:off x="4685951" y="3435484"/>
+            <a:ext cx="2534870" cy="1463999"/>
+          </a:xfrm>
+          <a:prstGeom prst="rect">
+            <a:avLst/>
+          </a:prstGeom>
+          <a:noFill/>
+          <a:extLst>
+            <a:ext uri="{909E8E84-426E-40DD-AFC4-6F175D3DCCD1}">
+              <a14:hiddenFill xmlns:a14="http://schemas.microsoft.com/office/drawing/2010/main">
+                <a:solidFill>
+                  <a:srgbClr val="FFFFFF"/>
+                </a:solidFill>
+              </a14:hiddenFill>
+            </a:ext>
+          </a:extLst>
+        </p:spPr>
+      </p:pic>
+      <p:pic>
+        <p:nvPicPr>
+          <p:cNvPr id="1030" name="Picture 6">
+            <a:extLst>
+              <a:ext uri="{FF2B5EF4-FFF2-40B4-BE49-F238E27FC236}">
+                <a16:creationId xmlns:a16="http://schemas.microsoft.com/office/drawing/2014/main" id="{09C15ACB-212D-43F3-BCB2-1C5DDC8B4D92}"/>
+              </a:ext>
+            </a:extLst>
+          </p:cNvPr>
+          <p:cNvPicPr>
+            <a:picLocks noChangeAspect="1" noChangeArrowheads="1"/>
+          </p:cNvPicPr>
+          <p:nvPr/>
+        </p:nvPicPr>
+        <p:blipFill rotWithShape="1">
+          <a:blip r:embed="rId5">
+            <a:extLst>
+              <a:ext uri="{28A0092B-C50C-407E-A947-70E740481C1C}">
+                <a14:useLocalDpi xmlns:a14="http://schemas.microsoft.com/office/drawing/2010/main" val="0"/>
+              </a:ext>
+            </a:extLst>
+          </a:blip>
+          <a:srcRect t="8275" r="9749" b="6655"/>
+          <a:stretch/>
+        </p:blipFill>
+        <p:spPr bwMode="auto">
+          <a:xfrm>
+            <a:off x="7928293" y="3435483"/>
+            <a:ext cx="2718034" cy="1463999"/>
+          </a:xfrm>
+          <a:prstGeom prst="rect">
+            <a:avLst/>
+          </a:prstGeom>
+          <a:noFill/>
+          <a:extLst>
+            <a:ext uri="{909E8E84-426E-40DD-AFC4-6F175D3DCCD1}">
+              <a14:hiddenFill xmlns:a14="http://schemas.microsoft.com/office/drawing/2010/main">
+                <a:solidFill>
+                  <a:srgbClr val="FFFFFF"/>
+                </a:solidFill>
+              </a14:hiddenFill>
+            </a:ext>
+          </a:extLst>
+        </p:spPr>
+      </p:pic>
+      <p:sp>
+        <p:nvSpPr>
+          <p:cNvPr id="12" name="Rectangle 11">
+            <a:extLst>
+              <a:ext uri="{FF2B5EF4-FFF2-40B4-BE49-F238E27FC236}">
+                <a16:creationId xmlns:a16="http://schemas.microsoft.com/office/drawing/2014/main" id="{9C90E381-9299-47F8-AFA2-40749ECC1EE1}"/>
+              </a:ext>
+            </a:extLst>
+          </p:cNvPr>
+          <p:cNvSpPr/>
+          <p:nvPr/>
+        </p:nvSpPr>
+        <p:spPr>
+          <a:xfrm>
+            <a:off x="975918" y="5407521"/>
+            <a:ext cx="2606180" cy="769441"/>
+          </a:xfrm>
+          <a:prstGeom prst="rect">
+            <a:avLst/>
+          </a:prstGeom>
+        </p:spPr>
+        <p:txBody>
+          <a:bodyPr wrap="square">
+            <a:spAutoFit/>
+          </a:bodyPr>
+          <a:lstStyle/>
+          <a:p>
+            <a:r>
+              <a:rPr lang="en-US" sz="1100" dirty="0">
+                <a:hlinkClick r:id="rId2"/>
+              </a:rPr>
+              <a:t>https://notebooks.azure.com/felix-schuhbauer/projects/bsc-thesis-ml/html/Plots/Evaluation-Plots/Group1-Tuning-Impact-TunedRF.jpeg</a:t>
+            </a:r>
+            <a:endParaRPr lang="en-US" sz="1100" dirty="0"/>
+          </a:p>
+        </p:txBody>
+      </p:sp>
+      <p:sp>
+        <p:nvSpPr>
+          <p:cNvPr id="13" name="Rectangle 12">
+            <a:extLst>
+              <a:ext uri="{FF2B5EF4-FFF2-40B4-BE49-F238E27FC236}">
+                <a16:creationId xmlns:a16="http://schemas.microsoft.com/office/drawing/2014/main" id="{1541DD91-9DB5-457C-BEB0-275E4BDFAA2C}"/>
+              </a:ext>
+            </a:extLst>
+          </p:cNvPr>
+          <p:cNvSpPr/>
+          <p:nvPr/>
+        </p:nvSpPr>
+        <p:spPr>
+          <a:xfrm>
+            <a:off x="4650296" y="5407520"/>
+            <a:ext cx="2606180" cy="769441"/>
+          </a:xfrm>
+          <a:prstGeom prst="rect">
+            <a:avLst/>
+          </a:prstGeom>
+        </p:spPr>
+        <p:txBody>
+          <a:bodyPr wrap="square">
+            <a:spAutoFit/>
+          </a:bodyPr>
+          <a:lstStyle/>
+          <a:p>
+            <a:r>
+              <a:rPr lang="en-US" sz="1100" dirty="0">
+                <a:hlinkClick r:id="rId2"/>
+              </a:rPr>
+              <a:t>https://notebooks.azure.com/felix-schuhbauer/projects/bsc-thesis-ml/html/Plots/Evaluation-Plots/Group2-Tuning-Impact-TunedRF.jpeg</a:t>
+            </a:r>
+            <a:endParaRPr lang="en-US" sz="1100" dirty="0"/>
+          </a:p>
+        </p:txBody>
+      </p:sp>
+      <p:sp>
+        <p:nvSpPr>
+          <p:cNvPr id="14" name="Rectangle 13">
+            <a:extLst>
+              <a:ext uri="{FF2B5EF4-FFF2-40B4-BE49-F238E27FC236}">
+                <a16:creationId xmlns:a16="http://schemas.microsoft.com/office/drawing/2014/main" id="{39CA1ABA-EC52-409E-AC45-AF7BA02E678D}"/>
+              </a:ext>
+            </a:extLst>
+          </p:cNvPr>
+          <p:cNvSpPr/>
+          <p:nvPr/>
+        </p:nvSpPr>
+        <p:spPr>
+          <a:xfrm>
+            <a:off x="8324674" y="5407519"/>
+            <a:ext cx="2606180" cy="769441"/>
+          </a:xfrm>
+          <a:prstGeom prst="rect">
+            <a:avLst/>
+          </a:prstGeom>
+        </p:spPr>
+        <p:txBody>
+          <a:bodyPr wrap="square">
+            <a:spAutoFit/>
+          </a:bodyPr>
+          <a:lstStyle/>
+          <a:p>
+            <a:r>
+              <a:rPr lang="en-US" sz="1100" dirty="0">
+                <a:hlinkClick r:id="rId2"/>
+              </a:rPr>
+              <a:t>https://notebooks.azure.com/felix-schuhbauer/projects/bsc-thesis-ml/html/Plots/Evaluation-Plots/Group3-Tuning-Impact-TunedRF.jpeg</a:t>
+            </a:r>
+            <a:endParaRPr lang="en-US" sz="1100" dirty="0"/>
           </a:p>
         </p:txBody>
       </p:sp>
     </p:spTree>
     <p:extLst>
       <p:ext uri="{BB962C8B-B14F-4D97-AF65-F5344CB8AC3E}">
-        <p14:creationId xmlns:p14="http://schemas.microsoft.com/office/powerpoint/2010/main" val="301356363"/>
+        <p14:creationId xmlns:p14="http://schemas.microsoft.com/office/powerpoint/2010/main" val="3333138379"/>
       </p:ext>
     </p:extLst>
   </p:cSld>
@@ -3691,6 +4153,286 @@
       </p:grpSpPr>
       <p:sp>
         <p:nvSpPr>
+          <p:cNvPr id="2" name="Title 1">
+            <a:extLst>
+              <a:ext uri="{FF2B5EF4-FFF2-40B4-BE49-F238E27FC236}">
+                <a16:creationId xmlns:a16="http://schemas.microsoft.com/office/drawing/2014/main" id="{2660A2BC-9689-48A6-A0B2-70FFF2379F43}"/>
+              </a:ext>
+            </a:extLst>
+          </p:cNvPr>
+          <p:cNvSpPr>
+            <a:spLocks noGrp="1"/>
+          </p:cNvSpPr>
+          <p:nvPr>
+            <p:ph type="title"/>
+          </p:nvPr>
+        </p:nvSpPr>
+        <p:spPr/>
+        <p:txBody>
+          <a:bodyPr>
+            <a:normAutofit/>
+          </a:bodyPr>
+          <a:lstStyle/>
+          <a:p>
+            <a:r>
+              <a:rPr lang="de-DE" sz="3200" dirty="0"/>
+              <a:t>Versuche, Tuning zu verbessern: 1/2/5TSCV Tuning besser? Normals 3fCV? Anderes „Scoring“?</a:t>
+            </a:r>
+            <a:endParaRPr lang="en-US" sz="3200" dirty="0"/>
+          </a:p>
+        </p:txBody>
+      </p:sp>
+      <p:sp>
+        <p:nvSpPr>
+          <p:cNvPr id="3" name="Content Placeholder 2">
+            <a:extLst>
+              <a:ext uri="{FF2B5EF4-FFF2-40B4-BE49-F238E27FC236}">
+                <a16:creationId xmlns:a16="http://schemas.microsoft.com/office/drawing/2014/main" id="{90FDF474-613A-45F7-AD7F-75C2A6863187}"/>
+              </a:ext>
+            </a:extLst>
+          </p:cNvPr>
+          <p:cNvSpPr>
+            <a:spLocks noGrp="1"/>
+          </p:cNvSpPr>
+          <p:nvPr>
+            <p:ph idx="1"/>
+          </p:nvPr>
+        </p:nvSpPr>
+        <p:spPr/>
+        <p:txBody>
+          <a:bodyPr>
+            <a:normAutofit/>
+          </a:bodyPr>
+          <a:lstStyle/>
+          <a:p>
+            <a:pPr marL="0" indent="0">
+              <a:buNone/>
+            </a:pPr>
+            <a:r>
+              <a:rPr lang="de-DE" sz="1800" b="1" dirty="0"/>
+              <a:t>…Tuning-Impact-5TSCV.jpeg </a:t>
+            </a:r>
+            <a:r>
+              <a:rPr lang="de-DE" sz="1800" dirty="0"/>
+              <a:t>schwankt auch so stark wie 10TSCV </a:t>
+            </a:r>
+          </a:p>
+          <a:p>
+            <a:pPr>
+              <a:buFont typeface="Wingdings" panose="05000000000000000000" pitchFamily="2" charset="2"/>
+              <a:buChar char="à"/>
+            </a:pPr>
+            <a:r>
+              <a:rPr lang="de-DE" sz="1800" dirty="0">
+                <a:sym typeface="Wingdings" panose="05000000000000000000" pitchFamily="2" charset="2"/>
+              </a:rPr>
+              <a:t>Tuning generell für diesen </a:t>
+            </a:r>
+            <a:r>
+              <a:rPr lang="de-DE" sz="1800" dirty="0" err="1">
+                <a:sym typeface="Wingdings" panose="05000000000000000000" pitchFamily="2" charset="2"/>
+              </a:rPr>
+              <a:t>Anwendugnsfall</a:t>
+            </a:r>
+            <a:r>
+              <a:rPr lang="de-DE" sz="1800" dirty="0">
+                <a:sym typeface="Wingdings" panose="05000000000000000000" pitchFamily="2" charset="2"/>
+              </a:rPr>
+              <a:t> sehr schwer</a:t>
+            </a:r>
+          </a:p>
+          <a:p>
+            <a:pPr>
+              <a:buFont typeface="Wingdings" panose="05000000000000000000" pitchFamily="2" charset="2"/>
+              <a:buChar char="à"/>
+            </a:pPr>
+            <a:r>
+              <a:rPr lang="de-DE" sz="1800" dirty="0">
+                <a:sym typeface="Wingdings" panose="05000000000000000000" pitchFamily="2" charset="2"/>
+              </a:rPr>
+              <a:t>Zu wenige Daten, daher schwankt best-</a:t>
+            </a:r>
+            <a:r>
+              <a:rPr lang="de-DE" sz="1800" dirty="0" err="1">
+                <a:sym typeface="Wingdings" panose="05000000000000000000" pitchFamily="2" charset="2"/>
+              </a:rPr>
+              <a:t>param</a:t>
+            </a:r>
+            <a:r>
+              <a:rPr lang="de-DE" sz="1800" dirty="0">
+                <a:sym typeface="Wingdings" panose="05000000000000000000" pitchFamily="2" charset="2"/>
+              </a:rPr>
+              <a:t> stark</a:t>
+            </a:r>
+          </a:p>
+          <a:p>
+            <a:pPr>
+              <a:buFont typeface="Wingdings" panose="05000000000000000000" pitchFamily="2" charset="2"/>
+              <a:buChar char="à"/>
+            </a:pPr>
+            <a:endParaRPr lang="de-DE" sz="1800" dirty="0">
+              <a:sym typeface="Wingdings" panose="05000000000000000000" pitchFamily="2" charset="2"/>
+            </a:endParaRPr>
+          </a:p>
+          <a:p>
+            <a:pPr marL="0" indent="0">
+              <a:buNone/>
+            </a:pPr>
+            <a:r>
+              <a:rPr lang="de-DE" sz="1800" b="1" dirty="0">
+                <a:sym typeface="Wingdings" panose="05000000000000000000" pitchFamily="2" charset="2"/>
+              </a:rPr>
+              <a:t>…3fCV.jpeg</a:t>
+            </a:r>
+            <a:r>
+              <a:rPr lang="de-DE" sz="1800" dirty="0">
+                <a:sym typeface="Wingdings" panose="05000000000000000000" pitchFamily="2" charset="2"/>
+              </a:rPr>
+              <a:t>: Schwank ebenfalls so stark </a:t>
+            </a:r>
+          </a:p>
+          <a:p>
+            <a:pPr marL="0" indent="0">
+              <a:buNone/>
+            </a:pPr>
+            <a:r>
+              <a:rPr lang="de-DE" sz="1800" dirty="0">
+                <a:sym typeface="Wingdings" panose="05000000000000000000" pitchFamily="2" charset="2"/>
+              </a:rPr>
+              <a:t> Ergebnis bleibt: Tuning führt auf Datensets für Anwendung zu geringen Verbesserungen, </a:t>
+            </a:r>
+            <a:r>
+              <a:rPr lang="de-DE" sz="1800">
+                <a:sym typeface="Wingdings" panose="05000000000000000000" pitchFamily="2" charset="2"/>
+              </a:rPr>
+              <a:t>teilweise schlechter.</a:t>
+            </a:r>
+            <a:endParaRPr lang="de-DE" sz="1800" dirty="0">
+              <a:sym typeface="Wingdings" panose="05000000000000000000" pitchFamily="2" charset="2"/>
+            </a:endParaRPr>
+          </a:p>
+        </p:txBody>
+      </p:sp>
+    </p:spTree>
+    <p:extLst>
+      <p:ext uri="{BB962C8B-B14F-4D97-AF65-F5344CB8AC3E}">
+        <p14:creationId xmlns:p14="http://schemas.microsoft.com/office/powerpoint/2010/main" val="945581825"/>
+      </p:ext>
+    </p:extLst>
+  </p:cSld>
+  <p:clrMapOvr>
+    <a:masterClrMapping/>
+  </p:clrMapOvr>
+</p:sld>
+</file>
+
+<file path=ppt/slides/slide12.xml><?xml version="1.0" encoding="utf-8"?>
+<p:sld xmlns:a="http://schemas.openxmlformats.org/drawingml/2006/main" xmlns:r="http://schemas.openxmlformats.org/officeDocument/2006/relationships" xmlns:p="http://schemas.openxmlformats.org/presentationml/2006/main">
+  <p:cSld>
+    <p:spTree>
+      <p:nvGrpSpPr>
+        <p:cNvPr id="1" name=""/>
+        <p:cNvGrpSpPr/>
+        <p:nvPr/>
+      </p:nvGrpSpPr>
+      <p:grpSpPr>
+        <a:xfrm>
+          <a:off x="0" y="0"/>
+          <a:ext cx="0" cy="0"/>
+          <a:chOff x="0" y="0"/>
+          <a:chExt cx="0" cy="0"/>
+        </a:xfrm>
+      </p:grpSpPr>
+      <p:sp>
+        <p:nvSpPr>
+          <p:cNvPr id="2" name="Title 1">
+            <a:extLst>
+              <a:ext uri="{FF2B5EF4-FFF2-40B4-BE49-F238E27FC236}">
+                <a16:creationId xmlns:a16="http://schemas.microsoft.com/office/drawing/2014/main" id="{596AE776-D028-463F-ADE3-216DAE4A623C}"/>
+              </a:ext>
+            </a:extLst>
+          </p:cNvPr>
+          <p:cNvSpPr>
+            <a:spLocks noGrp="1"/>
+          </p:cNvSpPr>
+          <p:nvPr>
+            <p:ph type="title"/>
+          </p:nvPr>
+        </p:nvSpPr>
+        <p:spPr/>
+        <p:txBody>
+          <a:bodyPr/>
+          <a:lstStyle/>
+          <a:p>
+            <a:r>
+              <a:rPr lang="de-DE" dirty="0"/>
+              <a:t>Evtl. Histogramm, wie oft welcher Param-Wert? </a:t>
+            </a:r>
+            <a:endParaRPr lang="en-US" dirty="0"/>
+          </a:p>
+        </p:txBody>
+      </p:sp>
+      <p:sp>
+        <p:nvSpPr>
+          <p:cNvPr id="3" name="Content Placeholder 2">
+            <a:extLst>
+              <a:ext uri="{FF2B5EF4-FFF2-40B4-BE49-F238E27FC236}">
+                <a16:creationId xmlns:a16="http://schemas.microsoft.com/office/drawing/2014/main" id="{D32DB8D2-3CAD-4097-91D9-37627443D356}"/>
+              </a:ext>
+            </a:extLst>
+          </p:cNvPr>
+          <p:cNvSpPr>
+            <a:spLocks noGrp="1"/>
+          </p:cNvSpPr>
+          <p:nvPr>
+            <p:ph idx="1"/>
+          </p:nvPr>
+        </p:nvSpPr>
+        <p:spPr/>
+        <p:txBody>
+          <a:bodyPr/>
+          <a:lstStyle/>
+          <a:p>
+            <a:r>
+              <a:rPr lang="de-DE" dirty="0"/>
+              <a:t>TBD</a:t>
+            </a:r>
+            <a:endParaRPr lang="en-US" dirty="0"/>
+          </a:p>
+        </p:txBody>
+      </p:sp>
+    </p:spTree>
+    <p:extLst>
+      <p:ext uri="{BB962C8B-B14F-4D97-AF65-F5344CB8AC3E}">
+        <p14:creationId xmlns:p14="http://schemas.microsoft.com/office/powerpoint/2010/main" val="301356363"/>
+      </p:ext>
+    </p:extLst>
+  </p:cSld>
+  <p:clrMapOvr>
+    <a:masterClrMapping/>
+  </p:clrMapOvr>
+</p:sld>
+</file>
+
+<file path=ppt/slides/slide13.xml><?xml version="1.0" encoding="utf-8"?>
+<p:sld xmlns:a="http://schemas.openxmlformats.org/drawingml/2006/main" xmlns:r="http://schemas.openxmlformats.org/officeDocument/2006/relationships" xmlns:p="http://schemas.openxmlformats.org/presentationml/2006/main">
+  <p:cSld>
+    <p:spTree>
+      <p:nvGrpSpPr>
+        <p:cNvPr id="1" name=""/>
+        <p:cNvGrpSpPr/>
+        <p:nvPr/>
+      </p:nvGrpSpPr>
+      <p:grpSpPr>
+        <a:xfrm>
+          <a:off x="0" y="0"/>
+          <a:ext cx="0" cy="0"/>
+          <a:chOff x="0" y="0"/>
+          <a:chExt cx="0" cy="0"/>
+        </a:xfrm>
+      </p:grpSpPr>
+      <p:sp>
+        <p:nvSpPr>
           <p:cNvPr id="2" name="TextBox 1">
             <a:extLst>
               <a:ext uri="{FF2B5EF4-FFF2-40B4-BE49-F238E27FC236}">
@@ -3752,7 +4494,7 @@
 </p:sld>
 </file>
 
-<file path=ppt/slides/slide12.xml><?xml version="1.0" encoding="utf-8"?>
+<file path=ppt/slides/slide14.xml><?xml version="1.0" encoding="utf-8"?>
 <p:sld xmlns:a="http://schemas.openxmlformats.org/drawingml/2006/main" xmlns:r="http://schemas.openxmlformats.org/officeDocument/2006/relationships" xmlns:p="http://schemas.openxmlformats.org/presentationml/2006/main">
   <p:cSld>
     <p:spTree>
@@ -4187,7 +4929,7 @@
 </p:sld>
 </file>
 
-<file path=ppt/slides/slide13.xml><?xml version="1.0" encoding="utf-8"?>
+<file path=ppt/slides/slide15.xml><?xml version="1.0" encoding="utf-8"?>
 <p:sld xmlns:a="http://schemas.openxmlformats.org/drawingml/2006/main" xmlns:r="http://schemas.openxmlformats.org/officeDocument/2006/relationships" xmlns:p="http://schemas.openxmlformats.org/presentationml/2006/main">
   <p:cSld>
     <p:spTree>
@@ -4847,7 +5589,7 @@
 </p:sld>
 </file>
 
-<file path=ppt/slides/slide14.xml><?xml version="1.0" encoding="utf-8"?>
+<file path=ppt/slides/slide16.xml><?xml version="1.0" encoding="utf-8"?>
 <p:sld xmlns:a="http://schemas.openxmlformats.org/drawingml/2006/main" xmlns:r="http://schemas.openxmlformats.org/officeDocument/2006/relationships" xmlns:p="http://schemas.openxmlformats.org/presentationml/2006/main">
   <p:cSld>
     <p:spTree>
@@ -5495,7 +6237,7 @@
 </p:sld>
 </file>
 
-<file path=ppt/slides/slide15.xml><?xml version="1.0" encoding="utf-8"?>
+<file path=ppt/slides/slide17.xml><?xml version="1.0" encoding="utf-8"?>
 <p:sld xmlns:a="http://schemas.openxmlformats.org/drawingml/2006/main" xmlns:r="http://schemas.openxmlformats.org/officeDocument/2006/relationships" xmlns:p="http://schemas.openxmlformats.org/presentationml/2006/main">
   <p:cSld>
     <p:spTree>
@@ -6135,7 +6877,7 @@
 </p:sld>
 </file>
 
-<file path=ppt/slides/slide16.xml><?xml version="1.0" encoding="utf-8"?>
+<file path=ppt/slides/slide18.xml><?xml version="1.0" encoding="utf-8"?>
 <p:sld xmlns:a="http://schemas.openxmlformats.org/drawingml/2006/main" xmlns:r="http://schemas.openxmlformats.org/officeDocument/2006/relationships" xmlns:p="http://schemas.openxmlformats.org/presentationml/2006/main">
   <p:cSld>
     <p:spTree>
@@ -8783,7 +9525,7 @@
         </p:nvSpPr>
         <p:spPr bwMode="auto">
           <a:xfrm>
-            <a:off x="955646" y="4271715"/>
+            <a:off x="897622" y="2261037"/>
             <a:ext cx="7751428" cy="1723549"/>
           </a:xfrm>
           <a:prstGeom prst="rect">
@@ -8923,7 +9665,7 @@
         </p:nvSpPr>
         <p:spPr bwMode="auto">
           <a:xfrm>
-            <a:off x="989901" y="2345742"/>
+            <a:off x="897622" y="4241654"/>
             <a:ext cx="7751428" cy="1723549"/>
           </a:xfrm>
           <a:prstGeom prst="rect">

</xml_diff>